<commit_message>
Post session code along and corrections
</commit_message>
<xml_diff>
--- a/Arrays_HOF/Arrays_HOF.pptx
+++ b/Arrays_HOF/Arrays_HOF.pptx
@@ -3981,7 +3981,7 @@
           <a:p>
             <a:fld id="{A5C20BB3-3CCB-4FE5-991B-82F6BCB48AF3}" type="datetimeFigureOut">
               <a:rPr lang="en-US" smtClean="0"/>
-              <a:t>7/16/18</a:t>
+              <a:t>7/24/18</a:t>
             </a:fld>
             <a:endParaRPr lang="en-US" dirty="0"/>
           </a:p>
@@ -5430,7 +5430,7 @@
           <a:p>
             <a:fld id="{1555EDF9-3D79-45DA-8367-2F63551C4C7D}" type="datetimeFigureOut">
               <a:rPr lang="en-US" smtClean="0"/>
-              <a:t>7/16/18</a:t>
+              <a:t>7/24/18</a:t>
             </a:fld>
             <a:endParaRPr lang="en-US" dirty="0"/>
           </a:p>
@@ -5598,7 +5598,7 @@
           <a:p>
             <a:fld id="{1555EDF9-3D79-45DA-8367-2F63551C4C7D}" type="datetimeFigureOut">
               <a:rPr lang="en-US" smtClean="0"/>
-              <a:t>7/16/18</a:t>
+              <a:t>7/24/18</a:t>
             </a:fld>
             <a:endParaRPr lang="en-US" dirty="0"/>
           </a:p>
@@ -5776,7 +5776,7 @@
           <a:p>
             <a:fld id="{1555EDF9-3D79-45DA-8367-2F63551C4C7D}" type="datetimeFigureOut">
               <a:rPr lang="en-US" smtClean="0"/>
-              <a:t>7/16/18</a:t>
+              <a:t>7/24/18</a:t>
             </a:fld>
             <a:endParaRPr lang="en-US" dirty="0"/>
           </a:p>
@@ -5944,7 +5944,7 @@
           <a:p>
             <a:fld id="{1555EDF9-3D79-45DA-8367-2F63551C4C7D}" type="datetimeFigureOut">
               <a:rPr lang="en-US" smtClean="0"/>
-              <a:t>7/16/18</a:t>
+              <a:t>7/24/18</a:t>
             </a:fld>
             <a:endParaRPr lang="en-US" dirty="0"/>
           </a:p>
@@ -6189,7 +6189,7 @@
           <a:p>
             <a:fld id="{1555EDF9-3D79-45DA-8367-2F63551C4C7D}" type="datetimeFigureOut">
               <a:rPr lang="en-US" smtClean="0"/>
-              <a:t>7/16/18</a:t>
+              <a:t>7/24/18</a:t>
             </a:fld>
             <a:endParaRPr lang="en-US" dirty="0"/>
           </a:p>
@@ -6418,7 +6418,7 @@
           <a:p>
             <a:fld id="{1555EDF9-3D79-45DA-8367-2F63551C4C7D}" type="datetimeFigureOut">
               <a:rPr lang="en-US" smtClean="0"/>
-              <a:t>7/16/18</a:t>
+              <a:t>7/24/18</a:t>
             </a:fld>
             <a:endParaRPr lang="en-US" dirty="0"/>
           </a:p>
@@ -6782,7 +6782,7 @@
           <a:p>
             <a:fld id="{1555EDF9-3D79-45DA-8367-2F63551C4C7D}" type="datetimeFigureOut">
               <a:rPr lang="en-US" smtClean="0"/>
-              <a:t>7/16/18</a:t>
+              <a:t>7/24/18</a:t>
             </a:fld>
             <a:endParaRPr lang="en-US" dirty="0"/>
           </a:p>
@@ -6899,7 +6899,7 @@
           <a:p>
             <a:fld id="{1555EDF9-3D79-45DA-8367-2F63551C4C7D}" type="datetimeFigureOut">
               <a:rPr lang="en-US" smtClean="0"/>
-              <a:t>7/16/18</a:t>
+              <a:t>7/24/18</a:t>
             </a:fld>
             <a:endParaRPr lang="en-US" dirty="0"/>
           </a:p>
@@ -6994,7 +6994,7 @@
           <a:p>
             <a:fld id="{1555EDF9-3D79-45DA-8367-2F63551C4C7D}" type="datetimeFigureOut">
               <a:rPr lang="en-US" smtClean="0"/>
-              <a:t>7/16/18</a:t>
+              <a:t>7/24/18</a:t>
             </a:fld>
             <a:endParaRPr lang="en-US" dirty="0"/>
           </a:p>
@@ -7269,7 +7269,7 @@
           <a:p>
             <a:fld id="{1555EDF9-3D79-45DA-8367-2F63551C4C7D}" type="datetimeFigureOut">
               <a:rPr lang="en-US" smtClean="0"/>
-              <a:t>7/16/18</a:t>
+              <a:t>7/24/18</a:t>
             </a:fld>
             <a:endParaRPr lang="en-US" dirty="0"/>
           </a:p>
@@ -7524,7 +7524,7 @@
           <a:p>
             <a:fld id="{1555EDF9-3D79-45DA-8367-2F63551C4C7D}" type="datetimeFigureOut">
               <a:rPr lang="en-US" smtClean="0"/>
-              <a:t>7/16/18</a:t>
+              <a:t>7/24/18</a:t>
             </a:fld>
             <a:endParaRPr lang="en-US" dirty="0"/>
           </a:p>
@@ -7735,7 +7735,7 @@
           <a:p>
             <a:fld id="{1555EDF9-3D79-45DA-8367-2F63551C4C7D}" type="datetimeFigureOut">
               <a:rPr lang="en-US" smtClean="0"/>
-              <a:t>7/16/18</a:t>
+              <a:t>7/24/18</a:t>
             </a:fld>
             <a:endParaRPr lang="en-US" dirty="0"/>
           </a:p>
@@ -9280,7 +9280,7 @@
             </a:r>
             <a:r>
               <a:rPr lang="en-US" sz="1600" dirty="0"/>
-              <a:t>].every(</a:t>
+              <a:t>].map(</a:t>
             </a:r>
             <a:r>
               <a:rPr lang="en-US" sz="1600" dirty="0">
@@ -9384,7 +9384,7 @@
             </a:r>
             <a:r>
               <a:rPr lang="en-US" sz="1600" dirty="0"/>
-              <a:t>].every(</a:t>
+              <a:t>].map(</a:t>
             </a:r>
             <a:r>
               <a:rPr lang="en-US" sz="1600" dirty="0">
@@ -10825,7 +10825,7 @@
             </a:r>
             <a:r>
               <a:rPr lang="en-US" sz="1600" dirty="0"/>
-              <a:t>].every(</a:t>
+              <a:t>].reduce(</a:t>
             </a:r>
             <a:r>
               <a:rPr lang="en-US" sz="1600" dirty="0">
@@ -10904,7 +10904,7 @@
             </a:r>
             <a:r>
               <a:rPr lang="en-US" sz="1600" dirty="0"/>
-              <a:t>].every(</a:t>
+              <a:t>].reduce(</a:t>
             </a:r>
             <a:r>
               <a:rPr lang="en-US" sz="1600" dirty="0">
@@ -11032,7 +11032,7 @@
             </a:r>
             <a:r>
               <a:rPr lang="en-US" sz="1600" dirty="0"/>
-              <a:t>].every(</a:t>
+              <a:t>].reduce(</a:t>
             </a:r>
             <a:r>
               <a:rPr lang="en-US" sz="1600" dirty="0">
@@ -11633,8 +11633,27 @@
                 <a:ea typeface="+mn-ea"/>
                 <a:cs typeface="+mn-cs"/>
               </a:rPr>
-              <a:t>How to combine all the elements in this array in an operation?</a:t>
-            </a:r>
+              <a:t>How to sort all the elements in </a:t>
+            </a:r>
+            <a:r>
+              <a:rPr lang="en-US" sz="2000" kern="1200">
+                <a:solidFill>
+                  <a:schemeClr val="bg1"/>
+                </a:solidFill>
+                <a:latin typeface="+mn-lt"/>
+                <a:ea typeface="+mn-ea"/>
+                <a:cs typeface="+mn-cs"/>
+              </a:rPr>
+              <a:t>this array?</a:t>
+            </a:r>
+            <a:endParaRPr lang="en-US" sz="2000" kern="1200" dirty="0">
+              <a:solidFill>
+                <a:schemeClr val="bg1"/>
+              </a:solidFill>
+              <a:latin typeface="+mn-lt"/>
+              <a:ea typeface="+mn-ea"/>
+              <a:cs typeface="+mn-cs"/>
+            </a:endParaRPr>
           </a:p>
         </p:txBody>
       </p:sp>
@@ -11970,7 +11989,7 @@
             </a:r>
             <a:r>
               <a:rPr lang="en-US" sz="1600" dirty="0"/>
-              <a:t>].every(</a:t>
+              <a:t>].sort(</a:t>
             </a:r>
             <a:r>
               <a:rPr lang="en-US" sz="1600" dirty="0">
@@ -12074,7 +12093,7 @@
             </a:r>
             <a:r>
               <a:rPr lang="en-US" sz="1600" dirty="0"/>
-              <a:t>].every((</a:t>
+              <a:t>].sort((</a:t>
             </a:r>
             <a:r>
               <a:rPr lang="en-US" sz="1600" dirty="0">
@@ -14516,7 +14535,7 @@
             <a:r>
               <a:rPr lang="en-US" sz="1600" dirty="0">
                 <a:solidFill>
-                  <a:srgbClr val="0070C0"/>
+                  <a:srgbClr val="FF0000"/>
                 </a:solidFill>
               </a:rPr>
               <a:t>1</a:t>
@@ -15537,7 +15556,7 @@
             </a:r>
             <a:r>
               <a:rPr lang="en-US" sz="1600" dirty="0"/>
-              <a:t>].every(</a:t>
+              <a:t>].some(</a:t>
             </a:r>
             <a:r>
               <a:rPr lang="en-US" sz="1600" dirty="0">
@@ -15616,7 +15635,7 @@
             </a:r>
             <a:r>
               <a:rPr lang="en-US" sz="1600" dirty="0"/>
-              <a:t>].every(</a:t>
+              <a:t>].some(</a:t>
             </a:r>
             <a:r>
               <a:rPr lang="en-US" sz="1600" dirty="0">
@@ -15718,7 +15737,7 @@
             </a:r>
             <a:r>
               <a:rPr lang="en-US" sz="1600" dirty="0"/>
-              <a:t>].every(</a:t>
+              <a:t>].some(</a:t>
             </a:r>
             <a:r>
               <a:rPr lang="en-US" sz="1600" dirty="0">
@@ -16612,7 +16631,7 @@
             </a:r>
             <a:r>
               <a:rPr lang="en-US" sz="1600" dirty="0"/>
-              <a:t>].every(</a:t>
+              <a:t>].filter(</a:t>
             </a:r>
             <a:r>
               <a:rPr lang="en-US" sz="1600" dirty="0">
@@ -16691,7 +16710,7 @@
             </a:r>
             <a:r>
               <a:rPr lang="en-US" sz="1600" dirty="0"/>
-              <a:t>].every(</a:t>
+              <a:t>].filter(</a:t>
             </a:r>
             <a:r>
               <a:rPr lang="en-US" sz="1600" dirty="0">
@@ -16793,7 +16812,7 @@
             </a:r>
             <a:r>
               <a:rPr lang="en-US" sz="1600" dirty="0"/>
-              <a:t>].every(</a:t>
+              <a:t>].filter(</a:t>
             </a:r>
             <a:r>
               <a:rPr lang="en-US" sz="1600" dirty="0">
@@ -17683,7 +17702,7 @@
             </a:r>
             <a:r>
               <a:rPr lang="en-US" sz="1600" dirty="0"/>
-              <a:t>].every(</a:t>
+              <a:t>].find(</a:t>
             </a:r>
             <a:r>
               <a:rPr lang="en-US" sz="1600" dirty="0">
@@ -17762,7 +17781,7 @@
             </a:r>
             <a:r>
               <a:rPr lang="en-US" sz="1600" dirty="0"/>
-              <a:t>].every(</a:t>
+              <a:t>].find(</a:t>
             </a:r>
             <a:r>
               <a:rPr lang="en-US" sz="1600" dirty="0">
@@ -17864,7 +17883,7 @@
             </a:r>
             <a:r>
               <a:rPr lang="en-US" sz="1600" dirty="0"/>
-              <a:t>].every(</a:t>
+              <a:t>].find(</a:t>
             </a:r>
             <a:r>
               <a:rPr lang="en-US" sz="1600" dirty="0">
@@ -18765,7 +18784,15 @@
             </a:r>
             <a:r>
               <a:rPr lang="en-US" sz="1600" dirty="0"/>
-              <a:t>].every(</a:t>
+              <a:t>].</a:t>
+            </a:r>
+            <a:r>
+              <a:rPr lang="en-US" sz="1600" dirty="0" err="1"/>
+              <a:t>findIndex</a:t>
+            </a:r>
+            <a:r>
+              <a:rPr lang="en-US" sz="1600" dirty="0"/>
+              <a:t>(</a:t>
             </a:r>
             <a:r>
               <a:rPr lang="en-US" sz="1600" dirty="0">
@@ -18844,7 +18871,15 @@
             </a:r>
             <a:r>
               <a:rPr lang="en-US" sz="1600" dirty="0"/>
-              <a:t>].every(</a:t>
+              <a:t>].</a:t>
+            </a:r>
+            <a:r>
+              <a:rPr lang="en-US" sz="1600" dirty="0" err="1"/>
+              <a:t>findIndex</a:t>
+            </a:r>
+            <a:r>
+              <a:rPr lang="en-US" sz="1600" dirty="0"/>
+              <a:t>(</a:t>
             </a:r>
             <a:r>
               <a:rPr lang="en-US" sz="1600" dirty="0">
@@ -18946,7 +18981,15 @@
             </a:r>
             <a:r>
               <a:rPr lang="en-US" sz="1600" dirty="0"/>
-              <a:t>].every(</a:t>
+              <a:t>].</a:t>
+            </a:r>
+            <a:r>
+              <a:rPr lang="en-US" sz="1600" dirty="0" err="1"/>
+              <a:t>findIndex</a:t>
+            </a:r>
+            <a:r>
+              <a:rPr lang="en-US" sz="1600" dirty="0"/>
+              <a:t>(</a:t>
             </a:r>
             <a:r>
               <a:rPr lang="en-US" sz="1600" dirty="0">
@@ -19870,7 +19913,15 @@
             </a:r>
             <a:r>
               <a:rPr lang="en-US" sz="1600" dirty="0"/>
-              <a:t>].every(</a:t>
+              <a:t>].</a:t>
+            </a:r>
+            <a:r>
+              <a:rPr lang="en-US" sz="1600" dirty="0" err="1"/>
+              <a:t>forEach</a:t>
+            </a:r>
+            <a:r>
+              <a:rPr lang="en-US" sz="1600" dirty="0"/>
+              <a:t>(</a:t>
             </a:r>
             <a:r>
               <a:rPr lang="en-US" sz="1600" dirty="0">

</xml_diff>